<commit_message>
Product Tag linked entity added
</commit_message>
<xml_diff>
--- a/Presentation/Calabonga.Catalog.pptx
+++ b/Presentation/Calabonga.Catalog.pptx
@@ -5,10 +5,10 @@
     <p:sldMasterId id="2147483762" r:id="rId1"/>
   </p:sldMasterIdLst>
   <p:notesMasterIdLst>
-    <p:notesMasterId r:id="rId27"/>
+    <p:notesMasterId r:id="rId28"/>
   </p:notesMasterIdLst>
   <p:handoutMasterIdLst>
-    <p:handoutMasterId r:id="rId28"/>
+    <p:handoutMasterId r:id="rId29"/>
   </p:handoutMasterIdLst>
   <p:sldIdLst>
     <p:sldId id="256" r:id="rId2"/>
@@ -36,6 +36,7 @@
     <p:sldId id="276" r:id="rId24"/>
     <p:sldId id="279" r:id="rId25"/>
     <p:sldId id="280" r:id="rId26"/>
+    <p:sldId id="281" r:id="rId27"/>
   </p:sldIdLst>
   <p:sldSz cx="12192000" cy="6858000"/>
   <p:notesSz cx="6858000" cy="9144000"/>
@@ -4281,6 +4282,67 @@
 </p:notes>
 </file>
 
+<file path=ppt/notesSlides/notesSlide22.xml><?xml version="1.0" encoding="utf-8"?>
+<p:notes xmlns:a="http://schemas.openxmlformats.org/drawingml/2006/main" xmlns:r="http://schemas.openxmlformats.org/officeDocument/2006/relationships" xmlns:p="http://schemas.openxmlformats.org/presentationml/2006/main">
+  <p:cSld>
+    <p:spTree>
+      <p:nvGrpSpPr>
+        <p:cNvPr id="1" name=""/>
+        <p:cNvGrpSpPr/>
+        <p:nvPr/>
+      </p:nvGrpSpPr>
+      <p:grpSpPr>
+        <a:xfrm>
+          <a:off x="0" y="0"/>
+          <a:ext cx="0" cy="0"/>
+          <a:chOff x="0" y="0"/>
+          <a:chExt cx="0" cy="0"/>
+        </a:xfrm>
+      </p:grpSpPr>
+      <p:sp>
+        <p:nvSpPr>
+          <p:cNvPr id="2" name="Образ слайда 1"/>
+          <p:cNvSpPr>
+            <a:spLocks noGrp="1" noRot="1" noChangeAspect="1"/>
+          </p:cNvSpPr>
+          <p:nvPr>
+            <p:ph type="sldImg"/>
+          </p:nvPr>
+        </p:nvSpPr>
+        <p:spPr/>
+      </p:sp>
+      <p:sp>
+        <p:nvSpPr>
+          <p:cNvPr id="3" name="Заметки 2"/>
+          <p:cNvSpPr>
+            <a:spLocks noGrp="1"/>
+          </p:cNvSpPr>
+          <p:nvPr>
+            <p:ph type="body" idx="1"/>
+          </p:nvPr>
+        </p:nvSpPr>
+        <p:spPr/>
+        <p:txBody>
+          <a:bodyPr/>
+          <a:lstStyle/>
+          <a:p>
+            <a:endParaRPr lang="en-US" dirty="0"/>
+          </a:p>
+        </p:txBody>
+      </p:sp>
+    </p:spTree>
+    <p:extLst>
+      <p:ext uri="{BB962C8B-B14F-4D97-AF65-F5344CB8AC3E}">
+        <p14:creationId xmlns:p14="http://schemas.microsoft.com/office/powerpoint/2010/main" val="1319998157"/>
+      </p:ext>
+    </p:extLst>
+  </p:cSld>
+  <p:clrMapOvr>
+    <a:masterClrMapping/>
+  </p:clrMapOvr>
+</p:notes>
+</file>
+
 <file path=ppt/notesSlides/notesSlide3.xml><?xml version="1.0" encoding="utf-8"?>
 <p:notes xmlns:a="http://schemas.openxmlformats.org/drawingml/2006/main" xmlns:r="http://schemas.openxmlformats.org/officeDocument/2006/relationships" xmlns:p="http://schemas.openxmlformats.org/presentationml/2006/main">
   <p:cSld>
@@ -21210,10 +21272,9 @@
               <a:t>Часть </a:t>
             </a:r>
             <a:r>
-              <a:rPr lang="en-US"/>
+              <a:rPr lang="en-US" dirty="0"/>
               <a:t>11</a:t>
             </a:r>
-            <a:endParaRPr lang="en-US" dirty="0"/>
           </a:p>
         </p:txBody>
       </p:sp>
@@ -23518,6 +23579,929 @@
 </p:sld>
 </file>
 
+<file path=ppt/slides/slide26.xml><?xml version="1.0" encoding="utf-8"?>
+<p:sld xmlns:a="http://schemas.openxmlformats.org/drawingml/2006/main" xmlns:r="http://schemas.openxmlformats.org/officeDocument/2006/relationships" xmlns:p="http://schemas.openxmlformats.org/presentationml/2006/main">
+  <p:cSld>
+    <p:spTree>
+      <p:nvGrpSpPr>
+        <p:cNvPr id="1" name=""/>
+        <p:cNvGrpSpPr/>
+        <p:nvPr/>
+      </p:nvGrpSpPr>
+      <p:grpSpPr>
+        <a:xfrm>
+          <a:off x="0" y="0"/>
+          <a:ext cx="0" cy="0"/>
+          <a:chOff x="0" y="0"/>
+          <a:chExt cx="0" cy="0"/>
+        </a:xfrm>
+      </p:grpSpPr>
+      <p:sp>
+        <p:nvSpPr>
+          <p:cNvPr id="2" name="Заголовок 1">
+            <a:extLst>
+              <a:ext uri="{FF2B5EF4-FFF2-40B4-BE49-F238E27FC236}">
+                <a16:creationId xmlns:a16="http://schemas.microsoft.com/office/drawing/2014/main" id="{5ED3076E-2E51-49BA-B663-2E6FD28DE68E}"/>
+              </a:ext>
+            </a:extLst>
+          </p:cNvPr>
+          <p:cNvSpPr>
+            <a:spLocks noGrp="1"/>
+          </p:cNvSpPr>
+          <p:nvPr>
+            <p:ph type="title"/>
+          </p:nvPr>
+        </p:nvSpPr>
+        <p:spPr/>
+        <p:txBody>
+          <a:bodyPr/>
+          <a:lstStyle/>
+          <a:p>
+            <a:r>
+              <a:rPr lang="ru-RU" dirty="0"/>
+              <a:t>Часть </a:t>
+            </a:r>
+            <a:r>
+              <a:rPr lang="en-US" dirty="0"/>
+              <a:t>11</a:t>
+            </a:r>
+          </a:p>
+        </p:txBody>
+      </p:sp>
+      <p:sp>
+        <p:nvSpPr>
+          <p:cNvPr id="46" name="Объект 45">
+            <a:extLst>
+              <a:ext uri="{FF2B5EF4-FFF2-40B4-BE49-F238E27FC236}">
+                <a16:creationId xmlns:a16="http://schemas.microsoft.com/office/drawing/2014/main" id="{52D0E0D2-6E1E-4C0F-B92A-A811703BEA5E}"/>
+              </a:ext>
+            </a:extLst>
+          </p:cNvPr>
+          <p:cNvSpPr>
+            <a:spLocks noGrp="1"/>
+          </p:cNvSpPr>
+          <p:nvPr>
+            <p:ph idx="1"/>
+          </p:nvPr>
+        </p:nvSpPr>
+        <p:spPr/>
+        <p:txBody>
+          <a:bodyPr>
+            <a:normAutofit/>
+          </a:bodyPr>
+          <a:lstStyle/>
+          <a:p>
+            <a:pPr marL="0" indent="0">
+              <a:buNone/>
+            </a:pPr>
+            <a:r>
+              <a:rPr lang="en-US" sz="3200" dirty="0"/>
+              <a:t>ASP.NET </a:t>
+            </a:r>
+            <a:r>
+              <a:rPr lang="en-US" sz="3200"/>
+              <a:t>Core v.2 </a:t>
+            </a:r>
+            <a:r>
+              <a:rPr lang="en-US" sz="3200" dirty="0"/>
+              <a:t>+ </a:t>
+            </a:r>
+            <a:r>
+              <a:rPr lang="en-US" sz="3200"/>
+              <a:t>EntityFramework Core v.2</a:t>
+            </a:r>
+            <a:endParaRPr lang="en-US" sz="3200" dirty="0"/>
+          </a:p>
+          <a:p>
+            <a:pPr marL="0" indent="0">
+              <a:buNone/>
+            </a:pPr>
+            <a:endParaRPr lang="en-US" sz="2800" dirty="0"/>
+          </a:p>
+        </p:txBody>
+      </p:sp>
+      <p:sp>
+        <p:nvSpPr>
+          <p:cNvPr id="6" name="Дата 5">
+            <a:extLst>
+              <a:ext uri="{FF2B5EF4-FFF2-40B4-BE49-F238E27FC236}">
+                <a16:creationId xmlns:a16="http://schemas.microsoft.com/office/drawing/2014/main" id="{3D389C93-18E8-4B65-9A0C-57EA5FF1262A}"/>
+              </a:ext>
+            </a:extLst>
+          </p:cNvPr>
+          <p:cNvSpPr>
+            <a:spLocks noGrp="1"/>
+          </p:cNvSpPr>
+          <p:nvPr>
+            <p:ph type="dt" sz="half" idx="10"/>
+          </p:nvPr>
+        </p:nvSpPr>
+        <p:spPr/>
+        <p:txBody>
+          <a:bodyPr/>
+          <a:lstStyle/>
+          <a:p>
+            <a:fld id="{2D4A23AA-1D21-4822-8346-CA7E14AECDD0}" type="datetime1">
+              <a:rPr lang="ru-RU" smtClean="0"/>
+              <a:pPr/>
+              <a:t>29.06.2019</a:t>
+            </a:fld>
+            <a:endParaRPr lang="en-US"/>
+          </a:p>
+        </p:txBody>
+      </p:sp>
+      <p:sp>
+        <p:nvSpPr>
+          <p:cNvPr id="7" name="Нижний колонтитул 6">
+            <a:extLst>
+              <a:ext uri="{FF2B5EF4-FFF2-40B4-BE49-F238E27FC236}">
+                <a16:creationId xmlns:a16="http://schemas.microsoft.com/office/drawing/2014/main" id="{FD3B82CA-042F-4A44-8CC3-391A074B55D4}"/>
+              </a:ext>
+            </a:extLst>
+          </p:cNvPr>
+          <p:cNvSpPr>
+            <a:spLocks noGrp="1"/>
+          </p:cNvSpPr>
+          <p:nvPr>
+            <p:ph type="ftr" sz="quarter" idx="11"/>
+          </p:nvPr>
+        </p:nvSpPr>
+        <p:spPr/>
+        <p:txBody>
+          <a:bodyPr/>
+          <a:lstStyle/>
+          <a:p>
+            <a:r>
+              <a:rPr lang="en-US" dirty="0"/>
+              <a:t>www.calabonga.net</a:t>
+            </a:r>
+          </a:p>
+        </p:txBody>
+      </p:sp>
+      <p:sp>
+        <p:nvSpPr>
+          <p:cNvPr id="8" name="Номер слайда 7">
+            <a:extLst>
+              <a:ext uri="{FF2B5EF4-FFF2-40B4-BE49-F238E27FC236}">
+                <a16:creationId xmlns:a16="http://schemas.microsoft.com/office/drawing/2014/main" id="{04E38101-A6CD-43DF-A008-79A5BF5D68AE}"/>
+              </a:ext>
+            </a:extLst>
+          </p:cNvPr>
+          <p:cNvSpPr>
+            <a:spLocks noGrp="1"/>
+          </p:cNvSpPr>
+          <p:nvPr>
+            <p:ph type="sldNum" sz="quarter" idx="12"/>
+          </p:nvPr>
+        </p:nvSpPr>
+        <p:spPr/>
+        <p:txBody>
+          <a:bodyPr/>
+          <a:lstStyle/>
+          <a:p>
+            <a:fld id="{356453D0-7C6D-4FAD-A87B-D4E72CD04107}" type="slidenum">
+              <a:rPr lang="en-US" smtClean="0"/>
+              <a:pPr/>
+              <a:t>26</a:t>
+            </a:fld>
+            <a:endParaRPr lang="en-US"/>
+          </a:p>
+        </p:txBody>
+      </p:sp>
+      <p:pic>
+        <p:nvPicPr>
+          <p:cNvPr id="3" name="Рисунок 2">
+            <a:extLst>
+              <a:ext uri="{FF2B5EF4-FFF2-40B4-BE49-F238E27FC236}">
+                <a16:creationId xmlns:a16="http://schemas.microsoft.com/office/drawing/2014/main" id="{7029C863-3135-4D2D-AB84-92740D0E2188}"/>
+              </a:ext>
+            </a:extLst>
+          </p:cNvPr>
+          <p:cNvPicPr>
+            <a:picLocks noChangeAspect="1"/>
+          </p:cNvPicPr>
+          <p:nvPr/>
+        </p:nvPicPr>
+        <p:blipFill>
+          <a:blip r:embed="rId3"/>
+          <a:stretch>
+            <a:fillRect/>
+          </a:stretch>
+        </p:blipFill>
+        <p:spPr>
+          <a:xfrm>
+            <a:off x="739648" y="3035550"/>
+            <a:ext cx="8931962" cy="1072271"/>
+          </a:xfrm>
+          <a:prstGeom prst="rect">
+            <a:avLst/>
+          </a:prstGeom>
+        </p:spPr>
+      </p:pic>
+      <p:sp>
+        <p:nvSpPr>
+          <p:cNvPr id="4" name="Прямоугольник 3">
+            <a:extLst>
+              <a:ext uri="{FF2B5EF4-FFF2-40B4-BE49-F238E27FC236}">
+                <a16:creationId xmlns:a16="http://schemas.microsoft.com/office/drawing/2014/main" id="{BF35D5F3-762A-4EA6-A992-48D326E16D40}"/>
+              </a:ext>
+            </a:extLst>
+          </p:cNvPr>
+          <p:cNvSpPr/>
+          <p:nvPr/>
+        </p:nvSpPr>
+        <p:spPr>
+          <a:xfrm>
+            <a:off x="1251712" y="4954048"/>
+            <a:ext cx="1873504" cy="918464"/>
+          </a:xfrm>
+          <a:prstGeom prst="rect">
+            <a:avLst/>
+          </a:prstGeom>
+        </p:spPr>
+        <p:style>
+          <a:lnRef idx="2">
+            <a:schemeClr val="accent4">
+              <a:shade val="50000"/>
+            </a:schemeClr>
+          </a:lnRef>
+          <a:fillRef idx="1">
+            <a:schemeClr val="accent4"/>
+          </a:fillRef>
+          <a:effectRef idx="0">
+            <a:schemeClr val="accent4"/>
+          </a:effectRef>
+          <a:fontRef idx="minor">
+            <a:schemeClr val="lt1"/>
+          </a:fontRef>
+        </p:style>
+        <p:txBody>
+          <a:bodyPr rtlCol="0" anchor="ctr"/>
+          <a:lstStyle/>
+          <a:p>
+            <a:pPr algn="ctr"/>
+            <a:r>
+              <a:rPr lang="en-US" dirty="0"/>
+              <a:t>Product</a:t>
+            </a:r>
+          </a:p>
+        </p:txBody>
+      </p:sp>
+      <p:sp>
+        <p:nvSpPr>
+          <p:cNvPr id="9" name="Прямоугольник 8">
+            <a:extLst>
+              <a:ext uri="{FF2B5EF4-FFF2-40B4-BE49-F238E27FC236}">
+                <a16:creationId xmlns:a16="http://schemas.microsoft.com/office/drawing/2014/main" id="{82EC349F-8D55-4EDA-980E-1B86949E538C}"/>
+              </a:ext>
+            </a:extLst>
+          </p:cNvPr>
+          <p:cNvSpPr/>
+          <p:nvPr/>
+        </p:nvSpPr>
+        <p:spPr>
+          <a:xfrm>
+            <a:off x="7260336" y="4954048"/>
+            <a:ext cx="1873504" cy="918464"/>
+          </a:xfrm>
+          <a:prstGeom prst="rect">
+            <a:avLst/>
+          </a:prstGeom>
+        </p:spPr>
+        <p:style>
+          <a:lnRef idx="2">
+            <a:schemeClr val="accent4">
+              <a:shade val="50000"/>
+            </a:schemeClr>
+          </a:lnRef>
+          <a:fillRef idx="1">
+            <a:schemeClr val="accent4"/>
+          </a:fillRef>
+          <a:effectRef idx="0">
+            <a:schemeClr val="accent4"/>
+          </a:effectRef>
+          <a:fontRef idx="minor">
+            <a:schemeClr val="lt1"/>
+          </a:fontRef>
+        </p:style>
+        <p:txBody>
+          <a:bodyPr rtlCol="0" anchor="ctr"/>
+          <a:lstStyle/>
+          <a:p>
+            <a:pPr algn="ctr"/>
+            <a:r>
+              <a:rPr lang="en-US" dirty="0"/>
+              <a:t>Tag</a:t>
+            </a:r>
+          </a:p>
+        </p:txBody>
+      </p:sp>
+      <p:sp>
+        <p:nvSpPr>
+          <p:cNvPr id="10" name="Прямоугольник 9">
+            <a:extLst>
+              <a:ext uri="{FF2B5EF4-FFF2-40B4-BE49-F238E27FC236}">
+                <a16:creationId xmlns:a16="http://schemas.microsoft.com/office/drawing/2014/main" id="{C5AF0BD0-181F-447D-B871-81D8BC7D84AD}"/>
+              </a:ext>
+            </a:extLst>
+          </p:cNvPr>
+          <p:cNvSpPr/>
+          <p:nvPr/>
+        </p:nvSpPr>
+        <p:spPr>
+          <a:xfrm>
+            <a:off x="4256024" y="4204243"/>
+            <a:ext cx="1873504" cy="918464"/>
+          </a:xfrm>
+          <a:prstGeom prst="rect">
+            <a:avLst/>
+          </a:prstGeom>
+        </p:spPr>
+        <p:style>
+          <a:lnRef idx="2">
+            <a:schemeClr val="accent4">
+              <a:shade val="50000"/>
+            </a:schemeClr>
+          </a:lnRef>
+          <a:fillRef idx="1">
+            <a:schemeClr val="accent4"/>
+          </a:fillRef>
+          <a:effectRef idx="0">
+            <a:schemeClr val="accent4"/>
+          </a:effectRef>
+          <a:fontRef idx="minor">
+            <a:schemeClr val="lt1"/>
+          </a:fontRef>
+        </p:style>
+        <p:txBody>
+          <a:bodyPr rtlCol="0" anchor="ctr"/>
+          <a:lstStyle/>
+          <a:p>
+            <a:pPr algn="ctr"/>
+            <a:r>
+              <a:rPr lang="en-US" dirty="0" err="1"/>
+              <a:t>ProductTag</a:t>
+            </a:r>
+            <a:endParaRPr lang="en-US" dirty="0"/>
+          </a:p>
+        </p:txBody>
+      </p:sp>
+      <p:cxnSp>
+        <p:nvCxnSpPr>
+          <p:cNvPr id="11" name="Прямая со стрелкой 10">
+            <a:extLst>
+              <a:ext uri="{FF2B5EF4-FFF2-40B4-BE49-F238E27FC236}">
+                <a16:creationId xmlns:a16="http://schemas.microsoft.com/office/drawing/2014/main" id="{735DFBF1-AE6F-436D-8E11-41445DE2673D}"/>
+              </a:ext>
+            </a:extLst>
+          </p:cNvPr>
+          <p:cNvCxnSpPr>
+            <a:stCxn id="4" idx="3"/>
+            <a:endCxn id="10" idx="1"/>
+          </p:cNvCxnSpPr>
+          <p:nvPr/>
+        </p:nvCxnSpPr>
+        <p:spPr>
+          <a:xfrm flipV="1">
+            <a:off x="3125216" y="4663475"/>
+            <a:ext cx="1130808" cy="749805"/>
+          </a:xfrm>
+          <a:prstGeom prst="straightConnector1">
+            <a:avLst/>
+          </a:prstGeom>
+          <a:ln w="9525" cap="flat" cmpd="sng" algn="ctr">
+            <a:solidFill>
+              <a:schemeClr val="tx1"/>
+            </a:solidFill>
+            <a:prstDash val="solid"/>
+            <a:round/>
+            <a:headEnd type="none" w="med" len="med"/>
+            <a:tailEnd type="triangle" w="med" len="med"/>
+          </a:ln>
+        </p:spPr>
+        <p:style>
+          <a:lnRef idx="0">
+            <a:scrgbClr r="0" g="0" b="0"/>
+          </a:lnRef>
+          <a:fillRef idx="0">
+            <a:scrgbClr r="0" g="0" b="0"/>
+          </a:fillRef>
+          <a:effectRef idx="0">
+            <a:scrgbClr r="0" g="0" b="0"/>
+          </a:effectRef>
+          <a:fontRef idx="minor">
+            <a:schemeClr val="tx1"/>
+          </a:fontRef>
+        </p:style>
+      </p:cxnSp>
+      <p:cxnSp>
+        <p:nvCxnSpPr>
+          <p:cNvPr id="13" name="Прямая со стрелкой 12">
+            <a:extLst>
+              <a:ext uri="{FF2B5EF4-FFF2-40B4-BE49-F238E27FC236}">
+                <a16:creationId xmlns:a16="http://schemas.microsoft.com/office/drawing/2014/main" id="{22BD3CF3-9E7D-4F5F-8525-045ADA21EF56}"/>
+              </a:ext>
+            </a:extLst>
+          </p:cNvPr>
+          <p:cNvCxnSpPr>
+            <a:stCxn id="9" idx="1"/>
+            <a:endCxn id="10" idx="3"/>
+          </p:cNvCxnSpPr>
+          <p:nvPr/>
+        </p:nvCxnSpPr>
+        <p:spPr>
+          <a:xfrm flipH="1" flipV="1">
+            <a:off x="6129528" y="4663475"/>
+            <a:ext cx="1130808" cy="749805"/>
+          </a:xfrm>
+          <a:prstGeom prst="straightConnector1">
+            <a:avLst/>
+          </a:prstGeom>
+          <a:ln>
+            <a:solidFill>
+              <a:schemeClr val="tx1"/>
+            </a:solidFill>
+            <a:tailEnd type="triangle"/>
+          </a:ln>
+        </p:spPr>
+        <p:style>
+          <a:lnRef idx="1">
+            <a:schemeClr val="accent1"/>
+          </a:lnRef>
+          <a:fillRef idx="0">
+            <a:schemeClr val="accent1"/>
+          </a:fillRef>
+          <a:effectRef idx="0">
+            <a:schemeClr val="accent1"/>
+          </a:effectRef>
+          <a:fontRef idx="minor">
+            <a:schemeClr val="tx1"/>
+          </a:fontRef>
+        </p:style>
+      </p:cxnSp>
+    </p:spTree>
+    <p:extLst>
+      <p:ext uri="{BB962C8B-B14F-4D97-AF65-F5344CB8AC3E}">
+        <p14:creationId xmlns:p14="http://schemas.microsoft.com/office/powerpoint/2010/main" val="2542041162"/>
+      </p:ext>
+    </p:extLst>
+  </p:cSld>
+  <p:clrMapOvr>
+    <a:masterClrMapping/>
+  </p:clrMapOvr>
+  <p:transition spd="med">
+    <p:pull/>
+  </p:transition>
+  <p:timing>
+    <p:tnLst>
+      <p:par>
+        <p:cTn id="1" dur="indefinite" restart="never" nodeType="tmRoot">
+          <p:childTnLst>
+            <p:seq concurrent="1" nextAc="seek">
+              <p:cTn id="2" dur="indefinite" nodeType="mainSeq">
+                <p:childTnLst>
+                  <p:par>
+                    <p:cTn id="3" fill="hold">
+                      <p:stCondLst>
+                        <p:cond delay="indefinite"/>
+                      </p:stCondLst>
+                      <p:childTnLst>
+                        <p:par>
+                          <p:cTn id="4" fill="hold">
+                            <p:stCondLst>
+                              <p:cond delay="0"/>
+                            </p:stCondLst>
+                            <p:childTnLst>
+                              <p:par>
+                                <p:cTn id="5" presetID="2" presetClass="entr" presetSubtype="4" fill="hold" nodeType="clickEffect">
+                                  <p:stCondLst>
+                                    <p:cond delay="0"/>
+                                  </p:stCondLst>
+                                  <p:childTnLst>
+                                    <p:set>
+                                      <p:cBhvr>
+                                        <p:cTn id="6" dur="1" fill="hold">
+                                          <p:stCondLst>
+                                            <p:cond delay="0"/>
+                                          </p:stCondLst>
+                                        </p:cTn>
+                                        <p:tgtEl>
+                                          <p:spTgt spid="3"/>
+                                        </p:tgtEl>
+                                        <p:attrNameLst>
+                                          <p:attrName>style.visibility</p:attrName>
+                                        </p:attrNameLst>
+                                      </p:cBhvr>
+                                      <p:to>
+                                        <p:strVal val="visible"/>
+                                      </p:to>
+                                    </p:set>
+                                    <p:anim calcmode="lin" valueType="num">
+                                      <p:cBhvr additive="base">
+                                        <p:cTn id="7" dur="500" fill="hold"/>
+                                        <p:tgtEl>
+                                          <p:spTgt spid="3"/>
+                                        </p:tgtEl>
+                                        <p:attrNameLst>
+                                          <p:attrName>ppt_x</p:attrName>
+                                        </p:attrNameLst>
+                                      </p:cBhvr>
+                                      <p:tavLst>
+                                        <p:tav tm="0">
+                                          <p:val>
+                                            <p:strVal val="#ppt_x"/>
+                                          </p:val>
+                                        </p:tav>
+                                        <p:tav tm="100000">
+                                          <p:val>
+                                            <p:strVal val="#ppt_x"/>
+                                          </p:val>
+                                        </p:tav>
+                                      </p:tavLst>
+                                    </p:anim>
+                                    <p:anim calcmode="lin" valueType="num">
+                                      <p:cBhvr additive="base">
+                                        <p:cTn id="8" dur="500" fill="hold"/>
+                                        <p:tgtEl>
+                                          <p:spTgt spid="3"/>
+                                        </p:tgtEl>
+                                        <p:attrNameLst>
+                                          <p:attrName>ppt_y</p:attrName>
+                                        </p:attrNameLst>
+                                      </p:cBhvr>
+                                      <p:tavLst>
+                                        <p:tav tm="0">
+                                          <p:val>
+                                            <p:strVal val="1+#ppt_h/2"/>
+                                          </p:val>
+                                        </p:tav>
+                                        <p:tav tm="100000">
+                                          <p:val>
+                                            <p:strVal val="#ppt_y"/>
+                                          </p:val>
+                                        </p:tav>
+                                      </p:tavLst>
+                                    </p:anim>
+                                  </p:childTnLst>
+                                </p:cTn>
+                              </p:par>
+                            </p:childTnLst>
+                          </p:cTn>
+                        </p:par>
+                      </p:childTnLst>
+                    </p:cTn>
+                  </p:par>
+                  <p:par>
+                    <p:cTn id="9" fill="hold">
+                      <p:stCondLst>
+                        <p:cond delay="indefinite"/>
+                      </p:stCondLst>
+                      <p:childTnLst>
+                        <p:par>
+                          <p:cTn id="10" fill="hold">
+                            <p:stCondLst>
+                              <p:cond delay="0"/>
+                            </p:stCondLst>
+                            <p:childTnLst>
+                              <p:par>
+                                <p:cTn id="11" presetID="53" presetClass="entr" presetSubtype="16" fill="hold" grpId="0" nodeType="clickEffect">
+                                  <p:stCondLst>
+                                    <p:cond delay="0"/>
+                                  </p:stCondLst>
+                                  <p:childTnLst>
+                                    <p:set>
+                                      <p:cBhvr>
+                                        <p:cTn id="12" dur="1" fill="hold">
+                                          <p:stCondLst>
+                                            <p:cond delay="0"/>
+                                          </p:stCondLst>
+                                        </p:cTn>
+                                        <p:tgtEl>
+                                          <p:spTgt spid="4"/>
+                                        </p:tgtEl>
+                                        <p:attrNameLst>
+                                          <p:attrName>style.visibility</p:attrName>
+                                        </p:attrNameLst>
+                                      </p:cBhvr>
+                                      <p:to>
+                                        <p:strVal val="visible"/>
+                                      </p:to>
+                                    </p:set>
+                                    <p:anim calcmode="lin" valueType="num">
+                                      <p:cBhvr>
+                                        <p:cTn id="13" dur="500" fill="hold"/>
+                                        <p:tgtEl>
+                                          <p:spTgt spid="4"/>
+                                        </p:tgtEl>
+                                        <p:attrNameLst>
+                                          <p:attrName>ppt_w</p:attrName>
+                                        </p:attrNameLst>
+                                      </p:cBhvr>
+                                      <p:tavLst>
+                                        <p:tav tm="0">
+                                          <p:val>
+                                            <p:fltVal val="0"/>
+                                          </p:val>
+                                        </p:tav>
+                                        <p:tav tm="100000">
+                                          <p:val>
+                                            <p:strVal val="#ppt_w"/>
+                                          </p:val>
+                                        </p:tav>
+                                      </p:tavLst>
+                                    </p:anim>
+                                    <p:anim calcmode="lin" valueType="num">
+                                      <p:cBhvr>
+                                        <p:cTn id="14" dur="500" fill="hold"/>
+                                        <p:tgtEl>
+                                          <p:spTgt spid="4"/>
+                                        </p:tgtEl>
+                                        <p:attrNameLst>
+                                          <p:attrName>ppt_h</p:attrName>
+                                        </p:attrNameLst>
+                                      </p:cBhvr>
+                                      <p:tavLst>
+                                        <p:tav tm="0">
+                                          <p:val>
+                                            <p:fltVal val="0"/>
+                                          </p:val>
+                                        </p:tav>
+                                        <p:tav tm="100000">
+                                          <p:val>
+                                            <p:strVal val="#ppt_h"/>
+                                          </p:val>
+                                        </p:tav>
+                                      </p:tavLst>
+                                    </p:anim>
+                                    <p:animEffect transition="in" filter="fade">
+                                      <p:cBhvr>
+                                        <p:cTn id="15" dur="500"/>
+                                        <p:tgtEl>
+                                          <p:spTgt spid="4"/>
+                                        </p:tgtEl>
+                                      </p:cBhvr>
+                                    </p:animEffect>
+                                  </p:childTnLst>
+                                </p:cTn>
+                              </p:par>
+                            </p:childTnLst>
+                          </p:cTn>
+                        </p:par>
+                      </p:childTnLst>
+                    </p:cTn>
+                  </p:par>
+                  <p:par>
+                    <p:cTn id="16" fill="hold">
+                      <p:stCondLst>
+                        <p:cond delay="indefinite"/>
+                      </p:stCondLst>
+                      <p:childTnLst>
+                        <p:par>
+                          <p:cTn id="17" fill="hold">
+                            <p:stCondLst>
+                              <p:cond delay="0"/>
+                            </p:stCondLst>
+                            <p:childTnLst>
+                              <p:par>
+                                <p:cTn id="18" presetID="53" presetClass="entr" presetSubtype="16" fill="hold" grpId="0" nodeType="clickEffect">
+                                  <p:stCondLst>
+                                    <p:cond delay="0"/>
+                                  </p:stCondLst>
+                                  <p:childTnLst>
+                                    <p:set>
+                                      <p:cBhvr>
+                                        <p:cTn id="19" dur="1" fill="hold">
+                                          <p:stCondLst>
+                                            <p:cond delay="0"/>
+                                          </p:stCondLst>
+                                        </p:cTn>
+                                        <p:tgtEl>
+                                          <p:spTgt spid="9"/>
+                                        </p:tgtEl>
+                                        <p:attrNameLst>
+                                          <p:attrName>style.visibility</p:attrName>
+                                        </p:attrNameLst>
+                                      </p:cBhvr>
+                                      <p:to>
+                                        <p:strVal val="visible"/>
+                                      </p:to>
+                                    </p:set>
+                                    <p:anim calcmode="lin" valueType="num">
+                                      <p:cBhvr>
+                                        <p:cTn id="20" dur="500" fill="hold"/>
+                                        <p:tgtEl>
+                                          <p:spTgt spid="9"/>
+                                        </p:tgtEl>
+                                        <p:attrNameLst>
+                                          <p:attrName>ppt_w</p:attrName>
+                                        </p:attrNameLst>
+                                      </p:cBhvr>
+                                      <p:tavLst>
+                                        <p:tav tm="0">
+                                          <p:val>
+                                            <p:fltVal val="0"/>
+                                          </p:val>
+                                        </p:tav>
+                                        <p:tav tm="100000">
+                                          <p:val>
+                                            <p:strVal val="#ppt_w"/>
+                                          </p:val>
+                                        </p:tav>
+                                      </p:tavLst>
+                                    </p:anim>
+                                    <p:anim calcmode="lin" valueType="num">
+                                      <p:cBhvr>
+                                        <p:cTn id="21" dur="500" fill="hold"/>
+                                        <p:tgtEl>
+                                          <p:spTgt spid="9"/>
+                                        </p:tgtEl>
+                                        <p:attrNameLst>
+                                          <p:attrName>ppt_h</p:attrName>
+                                        </p:attrNameLst>
+                                      </p:cBhvr>
+                                      <p:tavLst>
+                                        <p:tav tm="0">
+                                          <p:val>
+                                            <p:fltVal val="0"/>
+                                          </p:val>
+                                        </p:tav>
+                                        <p:tav tm="100000">
+                                          <p:val>
+                                            <p:strVal val="#ppt_h"/>
+                                          </p:val>
+                                        </p:tav>
+                                      </p:tavLst>
+                                    </p:anim>
+                                    <p:animEffect transition="in" filter="fade">
+                                      <p:cBhvr>
+                                        <p:cTn id="22" dur="500"/>
+                                        <p:tgtEl>
+                                          <p:spTgt spid="9"/>
+                                        </p:tgtEl>
+                                      </p:cBhvr>
+                                    </p:animEffect>
+                                  </p:childTnLst>
+                                </p:cTn>
+                              </p:par>
+                            </p:childTnLst>
+                          </p:cTn>
+                        </p:par>
+                      </p:childTnLst>
+                    </p:cTn>
+                  </p:par>
+                  <p:par>
+                    <p:cTn id="23" fill="hold">
+                      <p:stCondLst>
+                        <p:cond delay="indefinite"/>
+                      </p:stCondLst>
+                      <p:childTnLst>
+                        <p:par>
+                          <p:cTn id="24" fill="hold">
+                            <p:stCondLst>
+                              <p:cond delay="0"/>
+                            </p:stCondLst>
+                            <p:childTnLst>
+                              <p:par>
+                                <p:cTn id="25" presetID="22" presetClass="entr" presetSubtype="4" fill="hold" nodeType="clickEffect">
+                                  <p:stCondLst>
+                                    <p:cond delay="0"/>
+                                  </p:stCondLst>
+                                  <p:childTnLst>
+                                    <p:set>
+                                      <p:cBhvr>
+                                        <p:cTn id="26" dur="1" fill="hold">
+                                          <p:stCondLst>
+                                            <p:cond delay="0"/>
+                                          </p:stCondLst>
+                                        </p:cTn>
+                                        <p:tgtEl>
+                                          <p:spTgt spid="11"/>
+                                        </p:tgtEl>
+                                        <p:attrNameLst>
+                                          <p:attrName>style.visibility</p:attrName>
+                                        </p:attrNameLst>
+                                      </p:cBhvr>
+                                      <p:to>
+                                        <p:strVal val="visible"/>
+                                      </p:to>
+                                    </p:set>
+                                    <p:animEffect transition="in" filter="wipe(down)">
+                                      <p:cBhvr>
+                                        <p:cTn id="27" dur="500"/>
+                                        <p:tgtEl>
+                                          <p:spTgt spid="11"/>
+                                        </p:tgtEl>
+                                      </p:cBhvr>
+                                    </p:animEffect>
+                                  </p:childTnLst>
+                                </p:cTn>
+                              </p:par>
+                              <p:par>
+                                <p:cTn id="28" presetID="22" presetClass="entr" presetSubtype="4" fill="hold" grpId="0" nodeType="withEffect">
+                                  <p:stCondLst>
+                                    <p:cond delay="0"/>
+                                  </p:stCondLst>
+                                  <p:childTnLst>
+                                    <p:set>
+                                      <p:cBhvr>
+                                        <p:cTn id="29" dur="1" fill="hold">
+                                          <p:stCondLst>
+                                            <p:cond delay="0"/>
+                                          </p:stCondLst>
+                                        </p:cTn>
+                                        <p:tgtEl>
+                                          <p:spTgt spid="10"/>
+                                        </p:tgtEl>
+                                        <p:attrNameLst>
+                                          <p:attrName>style.visibility</p:attrName>
+                                        </p:attrNameLst>
+                                      </p:cBhvr>
+                                      <p:to>
+                                        <p:strVal val="visible"/>
+                                      </p:to>
+                                    </p:set>
+                                    <p:animEffect transition="in" filter="wipe(down)">
+                                      <p:cBhvr>
+                                        <p:cTn id="30" dur="500"/>
+                                        <p:tgtEl>
+                                          <p:spTgt spid="10"/>
+                                        </p:tgtEl>
+                                      </p:cBhvr>
+                                    </p:animEffect>
+                                  </p:childTnLst>
+                                </p:cTn>
+                              </p:par>
+                              <p:par>
+                                <p:cTn id="31" presetID="22" presetClass="entr" presetSubtype="4" fill="hold" nodeType="withEffect">
+                                  <p:stCondLst>
+                                    <p:cond delay="0"/>
+                                  </p:stCondLst>
+                                  <p:childTnLst>
+                                    <p:set>
+                                      <p:cBhvr>
+                                        <p:cTn id="32" dur="1" fill="hold">
+                                          <p:stCondLst>
+                                            <p:cond delay="0"/>
+                                          </p:stCondLst>
+                                        </p:cTn>
+                                        <p:tgtEl>
+                                          <p:spTgt spid="13"/>
+                                        </p:tgtEl>
+                                        <p:attrNameLst>
+                                          <p:attrName>style.visibility</p:attrName>
+                                        </p:attrNameLst>
+                                      </p:cBhvr>
+                                      <p:to>
+                                        <p:strVal val="visible"/>
+                                      </p:to>
+                                    </p:set>
+                                    <p:animEffect transition="in" filter="wipe(down)">
+                                      <p:cBhvr>
+                                        <p:cTn id="33" dur="500"/>
+                                        <p:tgtEl>
+                                          <p:spTgt spid="13"/>
+                                        </p:tgtEl>
+                                      </p:cBhvr>
+                                    </p:animEffect>
+                                  </p:childTnLst>
+                                </p:cTn>
+                              </p:par>
+                            </p:childTnLst>
+                          </p:cTn>
+                        </p:par>
+                      </p:childTnLst>
+                    </p:cTn>
+                  </p:par>
+                </p:childTnLst>
+              </p:cTn>
+              <p:prevCondLst>
+                <p:cond evt="onPrev" delay="0">
+                  <p:tgtEl>
+                    <p:sldTgt/>
+                  </p:tgtEl>
+                </p:cond>
+              </p:prevCondLst>
+              <p:nextCondLst>
+                <p:cond evt="onNext" delay="0">
+                  <p:tgtEl>
+                    <p:sldTgt/>
+                  </p:tgtEl>
+                </p:cond>
+              </p:nextCondLst>
+            </p:seq>
+          </p:childTnLst>
+        </p:cTn>
+      </p:par>
+    </p:tnLst>
+    <p:bldLst>
+      <p:bldP spid="4" grpId="0" animBg="1"/>
+      <p:bldP spid="9" grpId="0" animBg="1"/>
+      <p:bldP spid="10" grpId="0" animBg="1"/>
+    </p:bldLst>
+  </p:timing>
+</p:sld>
+</file>
+
 <file path=ppt/slides/slide3.xml><?xml version="1.0" encoding="utf-8"?>
 <p:sld xmlns:a="http://schemas.openxmlformats.org/drawingml/2006/main" xmlns:r="http://schemas.openxmlformats.org/officeDocument/2006/relationships" xmlns:p="http://schemas.openxmlformats.org/presentationml/2006/main">
   <p:cSld>

</xml_diff>